<commit_message>
Added code to the addOK function
</commit_message>
<xml_diff>
--- a/LectureNotes/Data_lab.pptx
+++ b/LectureNotes/Data_lab.pptx
@@ -236,7 +236,7 @@
           <a:p>
             <a:fld id="{BC6710E0-DE9E-4449-BE1A-60EBA0037C34}" type="datetimeFigureOut">
               <a:rPr lang="en-US" smtClean="0"/>
-              <a:t>1/7/2019</a:t>
+              <a:t>1/22/19</a:t>
             </a:fld>
             <a:endParaRPr lang="en-US"/>
           </a:p>
@@ -1470,7 +1470,7 @@
           <a:p>
             <a:fld id="{3038CB05-B921-4513-BED9-0B5EA5A413F7}" type="datetimeFigureOut">
               <a:rPr lang="en-US" smtClean="0"/>
-              <a:t>1/7/2019</a:t>
+              <a:t>1/22/19</a:t>
             </a:fld>
             <a:endParaRPr lang="en-US"/>
           </a:p>
@@ -1668,7 +1668,7 @@
           <a:p>
             <a:fld id="{3038CB05-B921-4513-BED9-0B5EA5A413F7}" type="datetimeFigureOut">
               <a:rPr lang="en-US" smtClean="0"/>
-              <a:t>1/7/2019</a:t>
+              <a:t>1/22/19</a:t>
             </a:fld>
             <a:endParaRPr lang="en-US"/>
           </a:p>
@@ -1876,7 +1876,7 @@
           <a:p>
             <a:fld id="{3038CB05-B921-4513-BED9-0B5EA5A413F7}" type="datetimeFigureOut">
               <a:rPr lang="en-US" smtClean="0"/>
-              <a:t>1/7/2019</a:t>
+              <a:t>1/22/19</a:t>
             </a:fld>
             <a:endParaRPr lang="en-US"/>
           </a:p>
@@ -2074,7 +2074,7 @@
           <a:p>
             <a:fld id="{3038CB05-B921-4513-BED9-0B5EA5A413F7}" type="datetimeFigureOut">
               <a:rPr lang="en-US" smtClean="0"/>
-              <a:t>1/7/2019</a:t>
+              <a:t>1/22/19</a:t>
             </a:fld>
             <a:endParaRPr lang="en-US"/>
           </a:p>
@@ -2349,7 +2349,7 @@
           <a:p>
             <a:fld id="{3038CB05-B921-4513-BED9-0B5EA5A413F7}" type="datetimeFigureOut">
               <a:rPr lang="en-US" smtClean="0"/>
-              <a:t>1/7/2019</a:t>
+              <a:t>1/22/19</a:t>
             </a:fld>
             <a:endParaRPr lang="en-US"/>
           </a:p>
@@ -2614,7 +2614,7 @@
           <a:p>
             <a:fld id="{3038CB05-B921-4513-BED9-0B5EA5A413F7}" type="datetimeFigureOut">
               <a:rPr lang="en-US" smtClean="0"/>
-              <a:t>1/7/2019</a:t>
+              <a:t>1/22/19</a:t>
             </a:fld>
             <a:endParaRPr lang="en-US"/>
           </a:p>
@@ -3026,7 +3026,7 @@
           <a:p>
             <a:fld id="{3038CB05-B921-4513-BED9-0B5EA5A413F7}" type="datetimeFigureOut">
               <a:rPr lang="en-US" smtClean="0"/>
-              <a:t>1/7/2019</a:t>
+              <a:t>1/22/19</a:t>
             </a:fld>
             <a:endParaRPr lang="en-US"/>
           </a:p>
@@ -3167,7 +3167,7 @@
           <a:p>
             <a:fld id="{3038CB05-B921-4513-BED9-0B5EA5A413F7}" type="datetimeFigureOut">
               <a:rPr lang="en-US" smtClean="0"/>
-              <a:t>1/7/2019</a:t>
+              <a:t>1/22/19</a:t>
             </a:fld>
             <a:endParaRPr lang="en-US"/>
           </a:p>
@@ -3280,7 +3280,7 @@
           <a:p>
             <a:fld id="{3038CB05-B921-4513-BED9-0B5EA5A413F7}" type="datetimeFigureOut">
               <a:rPr lang="en-US" smtClean="0"/>
-              <a:t>1/7/2019</a:t>
+              <a:t>1/22/19</a:t>
             </a:fld>
             <a:endParaRPr lang="en-US"/>
           </a:p>
@@ -3591,7 +3591,7 @@
           <a:p>
             <a:fld id="{3038CB05-B921-4513-BED9-0B5EA5A413F7}" type="datetimeFigureOut">
               <a:rPr lang="en-US" smtClean="0"/>
-              <a:t>1/7/2019</a:t>
+              <a:t>1/22/19</a:t>
             </a:fld>
             <a:endParaRPr lang="en-US"/>
           </a:p>
@@ -3879,7 +3879,7 @@
           <a:p>
             <a:fld id="{3038CB05-B921-4513-BED9-0B5EA5A413F7}" type="datetimeFigureOut">
               <a:rPr lang="en-US" smtClean="0"/>
-              <a:t>1/7/2019</a:t>
+              <a:t>1/22/19</a:t>
             </a:fld>
             <a:endParaRPr lang="en-US"/>
           </a:p>
@@ -4120,7 +4120,7 @@
           <a:p>
             <a:fld id="{3038CB05-B921-4513-BED9-0B5EA5A413F7}" type="datetimeFigureOut">
               <a:rPr lang="en-US" smtClean="0"/>
-              <a:t>1/7/2019</a:t>
+              <a:t>1/22/19</a:t>
             </a:fld>
             <a:endParaRPr lang="en-US"/>
           </a:p>

</xml_diff>